<commit_message>
video update, pptx update
</commit_message>
<xml_diff>
--- a/Licenta2018BudacaEduard/Implementarea eficientă a unui server Web.pptx
+++ b/Licenta2018BudacaEduard/Implementarea eficientă a unui server Web.pptx
@@ -5,7 +5,7 @@
     <p:sldMasterId id="2147483648" r:id="rId1"/>
   </p:sldMasterIdLst>
   <p:notesMasterIdLst>
-    <p:notesMasterId r:id="rId21"/>
+    <p:notesMasterId r:id="rId20"/>
   </p:notesMasterIdLst>
   <p:sldIdLst>
     <p:sldId id="256" r:id="rId2"/>
@@ -23,10 +23,9 @@
     <p:sldId id="281" r:id="rId14"/>
     <p:sldId id="276" r:id="rId15"/>
     <p:sldId id="277" r:id="rId16"/>
-    <p:sldId id="278" r:id="rId17"/>
-    <p:sldId id="279" r:id="rId18"/>
-    <p:sldId id="282" r:id="rId19"/>
-    <p:sldId id="283" r:id="rId20"/>
+    <p:sldId id="279" r:id="rId17"/>
+    <p:sldId id="282" r:id="rId18"/>
+    <p:sldId id="283" r:id="rId19"/>
   </p:sldIdLst>
   <p:sldSz cx="12192000" cy="6858000"/>
   <p:notesSz cx="6858000" cy="9144000"/>
@@ -753,7 +752,7 @@
           <a:p>
             <a:fld id="{6F15182D-6CE7-46A7-9586-70797D06AB20}" type="slidenum">
               <a:rPr lang="en-US" smtClean="0"/>
-              <a:t>18</a:t>
+              <a:t>17</a:t>
             </a:fld>
             <a:endParaRPr lang="en-US" dirty="0"/>
           </a:p>
@@ -4884,7 +4883,7 @@
           <a:p>
             <a:r>
               <a:rPr lang="ro-RO" dirty="0" smtClean="0"/>
-              <a:t>coordonator științific Conf. Dr. Sabin Buraga</a:t>
+              <a:t>coordonator științific Conf. Dr. Sabin-Corneliu Buraga</a:t>
             </a:r>
             <a:endParaRPr lang="en-US" dirty="0"/>
           </a:p>
@@ -4992,7 +4991,7 @@
           <a:p>
             <a:r>
               <a:rPr lang="ro-RO" dirty="0" smtClean="0"/>
-              <a:t>cel puțin la fel de puternic ca un parser </a:t>
+              <a:t>cel puțin la fel de expresiv ca un parser </a:t>
             </a:r>
             <a:r>
               <a:rPr lang="ro-RO" i="1" dirty="0"/>
@@ -5257,7 +5256,7 @@
           <a:p>
             <a:r>
               <a:rPr lang="ro-RO" dirty="0" smtClean="0"/>
-              <a:t>câteva funcționalități mai avansate în aceste framework-uri, dar se adaugă complexitate sistemului și concepte de învățat.</a:t>
+              <a:t>câteva funcționalități mai avansate în aceste framework-uri, dar se adaugă complexitate sistemului și concepte de învățat</a:t>
             </a:r>
             <a:endParaRPr lang="en-US" dirty="0"/>
           </a:p>
@@ -5342,7 +5341,7 @@
           <a:p>
             <a:r>
               <a:rPr lang="ro-RO" dirty="0" smtClean="0"/>
-              <a:t>teste sumare de performanță față de serverele implicite ale Flask și Django:</a:t>
+              <a:t>teste de performanță față de serverele implicite ale Flask și Django:</a:t>
             </a:r>
           </a:p>
           <a:p>
@@ -5725,17 +5724,6 @@
               <a:t>API pentru meniuri; WebSocket pentru joc</a:t>
             </a:r>
           </a:p>
-          <a:p>
-            <a:r>
-              <a:rPr lang="ro-RO" dirty="0"/>
-              <a:t>m</a:t>
-            </a:r>
-            <a:r>
-              <a:rPr lang="ro-RO" dirty="0" smtClean="0"/>
-              <a:t>omentan nefuncțional (infrastructură)</a:t>
-            </a:r>
-            <a:endParaRPr lang="ro-RO" dirty="0"/>
-          </a:p>
         </p:txBody>
       </p:sp>
     </p:spTree>
@@ -5805,46 +5793,60 @@
             <a:spLocks noGrp="1"/>
           </p:cNvSpPr>
           <p:nvPr>
-            <p:ph idx="1"/>
-          </p:nvPr>
-        </p:nvSpPr>
-        <p:spPr/>
-        <p:txBody>
-          <a:bodyPr/>
-          <a:lstStyle/>
-          <a:p>
-            <a:r>
-              <a:rPr lang="ro-RO" dirty="0" smtClean="0"/>
-              <a:t>rulează pe o plăcuță Onion Omega 2 Plus ( &lt; Raspberry Pi 1 Model A, &lt;&lt; Zero)</a:t>
-            </a:r>
-          </a:p>
-          <a:p>
-            <a:r>
-              <a:rPr lang="ro-RO" dirty="0"/>
-              <a:t>p</a:t>
-            </a:r>
-            <a:r>
-              <a:rPr lang="ro-RO" dirty="0" smtClean="0"/>
-              <a:t>atru ieșiri electrice → placă de </a:t>
-            </a:r>
-            <a:r>
-              <a:rPr lang="ro-RO" dirty="0"/>
-              <a:t>circuit → </a:t>
-            </a:r>
-            <a:r>
-              <a:rPr lang="ro-RO" dirty="0" smtClean="0"/>
-              <a:t>bandă de LED-uri RGB</a:t>
+            <p:ph sz="half" idx="1"/>
+          </p:nvPr>
+        </p:nvSpPr>
+        <p:spPr/>
+        <p:txBody>
+          <a:bodyPr/>
+          <a:lstStyle/>
+          <a:p>
+            <a:r>
+              <a:rPr lang="ro-RO" dirty="0" smtClean="0"/>
+              <a:t>rulează pe o plăcuță Onion Omega 2 Plus (resurse limitate, </a:t>
+            </a:r>
+            <a:br>
+              <a:rPr lang="ro-RO" dirty="0" smtClean="0"/>
+            </a:br>
+            <a:r>
+              <a:rPr lang="ro-RO" dirty="0" smtClean="0"/>
+              <a:t>&lt; Raspberry Pi 1 Model A,</a:t>
+            </a:r>
+            <a:br>
+              <a:rPr lang="ro-RO" dirty="0" smtClean="0"/>
+            </a:br>
+            <a:r>
+              <a:rPr lang="ro-RO" dirty="0" smtClean="0"/>
+              <a:t>&lt;&lt; Zero</a:t>
+            </a:r>
+            <a:r>
+              <a:rPr lang="en-US" dirty="0" smtClean="0"/>
+              <a:t>)</a:t>
+            </a:r>
+          </a:p>
+          <a:p>
+            <a:r>
+              <a:rPr lang="ro-RO" dirty="0" smtClean="0"/>
+              <a:t>o aplicație Web controlează LED-urile după sunetele unei melodii</a:t>
+            </a:r>
+          </a:p>
+          <a:p>
+            <a:r>
+              <a:rPr lang="ro-RO" dirty="0" smtClean="0"/>
+              <a:t>comunicarea cu serverul: prin WebSocket</a:t>
             </a:r>
           </a:p>
         </p:txBody>
       </p:sp>
       <p:pic>
         <p:nvPicPr>
-          <p:cNvPr id="5" name="Picture 4"/>
+          <p:cNvPr id="6" name="Content Placeholder 5"/>
           <p:cNvPicPr>
-            <a:picLocks noChangeAspect="1"/>
+            <a:picLocks noGrp="1" noChangeAspect="1"/>
           </p:cNvPicPr>
-          <p:nvPr/>
+          <p:nvPr>
+            <p:ph sz="half" idx="2"/>
+          </p:nvPr>
         </p:nvPicPr>
         <p:blipFill>
           <a:blip r:embed="rId2" cstate="print">
@@ -5860,8 +5862,8 @@
         </p:blipFill>
         <p:spPr>
           <a:xfrm>
-            <a:off x="3288117" y="3309184"/>
-            <a:ext cx="5449483" cy="3266594"/>
+            <a:off x="6172200" y="2448000"/>
+            <a:ext cx="5181600" cy="3106588"/>
           </a:xfrm>
           <a:prstGeom prst="rect">
             <a:avLst/>
@@ -5945,44 +5947,16 @@
           <a:p>
             <a:r>
               <a:rPr lang="ro-RO" dirty="0" smtClean="0"/>
-              <a:t>controlul </a:t>
-            </a:r>
-            <a:r>
-              <a:rPr lang="ro-RO" dirty="0"/>
-              <a:t>culorii </a:t>
-            </a:r>
-            <a:r>
-              <a:rPr lang="ro-RO" dirty="0" smtClean="0"/>
-              <a:t>LED-urilor: aplicație Web aflată pe server</a:t>
-            </a:r>
-          </a:p>
-          <a:p>
-            <a:pPr lvl="1"/>
-            <a:r>
-              <a:rPr lang="ro-RO" dirty="0" smtClean="0"/>
-              <a:t>după anumite reguli</a:t>
-            </a:r>
-          </a:p>
-          <a:p>
-            <a:pPr lvl="1"/>
-            <a:r>
-              <a:rPr lang="ro-RO" dirty="0" smtClean="0"/>
-              <a:t>după sunetele unei melodii</a:t>
-            </a:r>
-          </a:p>
-          <a:p>
-            <a:r>
-              <a:rPr lang="ro-RO" dirty="0" smtClean="0"/>
-              <a:t>comunicare server-client prin protocolul WebSocket</a:t>
-            </a:r>
-            <a:endParaRPr lang="ro-RO" dirty="0"/>
+              <a:t>[Videoclip demo]</a:t>
+            </a:r>
+            <a:endParaRPr lang="en-US" dirty="0"/>
           </a:p>
         </p:txBody>
       </p:sp>
     </p:spTree>
     <p:extLst>
       <p:ext uri="{BB962C8B-B14F-4D97-AF65-F5344CB8AC3E}">
-        <p14:creationId xmlns:p14="http://schemas.microsoft.com/office/powerpoint/2010/main" val="525034001"/>
+        <p14:creationId xmlns:p14="http://schemas.microsoft.com/office/powerpoint/2010/main" val="3905510145"/>
       </p:ext>
     </p:extLst>
   </p:cSld>
@@ -6032,89 +6006,6 @@
           <a:lstStyle/>
           <a:p>
             <a:r>
-              <a:rPr lang="ro-RO" dirty="0"/>
-              <a:t>Studiu de caz 2: Interfață de control a LED-urilor RGB</a:t>
-            </a:r>
-            <a:endParaRPr lang="en-US" dirty="0"/>
-          </a:p>
-        </p:txBody>
-      </p:sp>
-      <p:sp>
-        <p:nvSpPr>
-          <p:cNvPr id="3" name="Content Placeholder 2"/>
-          <p:cNvSpPr>
-            <a:spLocks noGrp="1"/>
-          </p:cNvSpPr>
-          <p:nvPr>
-            <p:ph idx="1"/>
-          </p:nvPr>
-        </p:nvSpPr>
-        <p:spPr/>
-        <p:txBody>
-          <a:bodyPr/>
-          <a:lstStyle/>
-          <a:p>
-            <a:r>
-              <a:rPr lang="ro-RO" dirty="0" smtClean="0"/>
-              <a:t>[Videoclip demo]</a:t>
-            </a:r>
-            <a:endParaRPr lang="en-US" dirty="0"/>
-          </a:p>
-        </p:txBody>
-      </p:sp>
-    </p:spTree>
-    <p:extLst>
-      <p:ext uri="{BB962C8B-B14F-4D97-AF65-F5344CB8AC3E}">
-        <p14:creationId xmlns:p14="http://schemas.microsoft.com/office/powerpoint/2010/main" val="3905510145"/>
-      </p:ext>
-    </p:extLst>
-  </p:cSld>
-  <p:clrMapOvr>
-    <a:masterClrMapping/>
-  </p:clrMapOvr>
-  <p:timing>
-    <p:tnLst>
-      <p:par>
-        <p:cTn id="1" dur="indefinite" restart="never" nodeType="tmRoot"/>
-      </p:par>
-    </p:tnLst>
-  </p:timing>
-</p:sld>
-</file>
-
-<file path=ppt/slides/slide18.xml><?xml version="1.0" encoding="utf-8"?>
-<p:sld xmlns:a="http://schemas.openxmlformats.org/drawingml/2006/main" xmlns:r="http://schemas.openxmlformats.org/officeDocument/2006/relationships" xmlns:p="http://schemas.openxmlformats.org/presentationml/2006/main">
-  <p:cSld>
-    <p:spTree>
-      <p:nvGrpSpPr>
-        <p:cNvPr id="1" name=""/>
-        <p:cNvGrpSpPr/>
-        <p:nvPr/>
-      </p:nvGrpSpPr>
-      <p:grpSpPr>
-        <a:xfrm>
-          <a:off x="0" y="0"/>
-          <a:ext cx="0" cy="0"/>
-          <a:chOff x="0" y="0"/>
-          <a:chExt cx="0" cy="0"/>
-        </a:xfrm>
-      </p:grpSpPr>
-      <p:sp>
-        <p:nvSpPr>
-          <p:cNvPr id="2" name="Title 1"/>
-          <p:cNvSpPr>
-            <a:spLocks noGrp="1"/>
-          </p:cNvSpPr>
-          <p:nvPr>
-            <p:ph type="title"/>
-          </p:nvPr>
-        </p:nvSpPr>
-        <p:spPr/>
-        <p:txBody>
-          <a:bodyPr/>
-          <a:lstStyle/>
-          <a:p>
-            <a:r>
               <a:rPr lang="ro-RO" dirty="0" smtClean="0"/>
               <a:t>Concluzii</a:t>
             </a:r>
@@ -6219,7 +6110,7 @@
 </p:sld>
 </file>
 
-<file path=ppt/slides/slide19.xml><?xml version="1.0" encoding="utf-8"?>
+<file path=ppt/slides/slide18.xml><?xml version="1.0" encoding="utf-8"?>
 <p:sld xmlns:a="http://schemas.openxmlformats.org/drawingml/2006/main" xmlns:r="http://schemas.openxmlformats.org/officeDocument/2006/relationships" xmlns:p="http://schemas.openxmlformats.org/presentationml/2006/main">
   <p:cSld>
     <p:spTree>
@@ -6402,16 +6293,20 @@
           </a:p>
           <a:p>
             <a:r>
-              <a:rPr lang="ro-RO" i="1" dirty="0"/>
-              <a:t>t</a:t>
-            </a:r>
-            <a:r>
               <a:rPr lang="ro-RO" i="1" dirty="0" smtClean="0"/>
-              <a:t>emplate</a:t>
-            </a:r>
-            <a:r>
-              <a:rPr lang="ro-RO" dirty="0" smtClean="0"/>
-              <a:t>-uri originale</a:t>
+              <a:t>template</a:t>
+            </a:r>
+            <a:r>
+              <a:rPr lang="ro-RO" dirty="0" smtClean="0"/>
+              <a:t>-uri</a:t>
+            </a:r>
+            <a:r>
+              <a:rPr lang="en-US" dirty="0" smtClean="0"/>
+              <a:t> </a:t>
+            </a:r>
+            <a:r>
+              <a:rPr lang="ro-RO" dirty="0" smtClean="0"/>
+              <a:t>(machete de vizualizare) originale</a:t>
             </a:r>
           </a:p>
           <a:p>
@@ -6431,8 +6326,12 @@
           </a:p>
           <a:p>
             <a:r>
+              <a:rPr lang="ro-RO" dirty="0" smtClean="0"/>
+              <a:t>demarat </a:t>
+            </a:r>
+            <a:r>
               <a:rPr lang="ro-RO" dirty="0"/>
-              <a:t>proiect pentru Rețele de Calculatoare, Tehnologii Web</a:t>
+              <a:t>pentru Rețele de Calculatoare, Tehnologii Web</a:t>
             </a:r>
             <a:endParaRPr lang="en-US" dirty="0"/>
           </a:p>
@@ -6744,6 +6643,15 @@
           <a:p>
             <a:r>
               <a:rPr lang="ro-RO" dirty="0" smtClean="0"/>
+              <a:t>DIAGRAMA DE SERVIRE DIN LICENTA</a:t>
+            </a:r>
+          </a:p>
+          <a:p>
+            <a:endParaRPr lang="ro-RO" dirty="0"/>
+          </a:p>
+          <a:p>
+            <a:r>
+              <a:rPr lang="ro-RO" dirty="0" smtClean="0"/>
               <a:t>procesarea cererilor HTTP</a:t>
             </a:r>
           </a:p>
@@ -6771,7 +6679,7 @@
             <a:pPr lvl="1"/>
             <a:r>
               <a:rPr lang="ro-RO" dirty="0" smtClean="0"/>
-              <a:t>cererea este rutată potrivit fișierului de configura</a:t>
+              <a:t>cererea este direcționată potrivit fișierului de configura</a:t>
             </a:r>
             <a:r>
               <a:rPr lang="en-US" dirty="0" smtClean="0"/>
@@ -7171,8 +7079,22 @@
               <a:t>config</a:t>
             </a:r>
             <a:r>
-              <a:rPr lang="ro-RO" dirty="0" smtClean="0"/>
+              <a:rPr lang="ro-RO" dirty="0"/>
               <a:t>”, „</a:t>
+            </a:r>
+            <a:r>
+              <a:rPr lang="ro-RO" dirty="0">
+                <a:latin typeface="Consolas" panose="020B0609020204030204" pitchFamily="49" charset="0"/>
+              </a:rPr>
+              <a:t>cookie</a:t>
+            </a:r>
+            <a:r>
+              <a:rPr lang="ro-RO" dirty="0"/>
+              <a:t>”, </a:t>
+            </a:r>
+            <a:r>
+              <a:rPr lang="ro-RO" dirty="0" smtClean="0"/>
+              <a:t>„</a:t>
             </a:r>
             <a:r>
               <a:rPr lang="ro-RO" dirty="0" smtClean="0">
@@ -7188,22 +7110,23 @@
               <a:rPr lang="ro-RO" dirty="0" smtClean="0">
                 <a:latin typeface="Consolas" panose="020B0609020204030204" pitchFamily="49" charset="0"/>
               </a:rPr>
-              <a:t>cookie</a:t>
-            </a:r>
-            <a:r>
-              <a:rPr lang="ro-RO" dirty="0" smtClean="0"/>
-              <a:t>”, „</a:t>
-            </a:r>
-            <a:r>
-              <a:rPr lang="ro-RO" dirty="0" smtClean="0">
-                <a:latin typeface="Consolas" panose="020B0609020204030204" pitchFamily="49" charset="0"/>
-              </a:rPr>
               <a:t>websockets</a:t>
             </a:r>
             <a:r>
               <a:rPr lang="ro-RO" dirty="0" smtClean="0"/>
               <a:t>”</a:t>
             </a:r>
+          </a:p>
+          <a:p>
+            <a:pPr lvl="1"/>
+            <a:endParaRPr lang="ro-RO" dirty="0"/>
+          </a:p>
+          <a:p>
+            <a:r>
+              <a:rPr lang="ro-RO" dirty="0" smtClean="0"/>
+              <a:t>TODO: configurare executabila</a:t>
+            </a:r>
+            <a:endParaRPr lang="ro-RO" dirty="0" smtClean="0"/>
           </a:p>
         </p:txBody>
       </p:sp>
@@ -7319,7 +7242,7 @@
             <a:pPr lvl="1"/>
             <a:r>
               <a:rPr lang="ro-RO" dirty="0" smtClean="0"/>
-              <a:t>cu, respectiv fără, sanitizare HTML</a:t>
+              <a:t>cu, respectiv fără, sanitizarea caracterelor speciale din HTML</a:t>
             </a:r>
           </a:p>
           <a:p>

</xml_diff>